<commit_message>
Level 1 Almost done.
Level 1 97% complete.
</commit_message>
<xml_diff>
--- a/Used Resorces (Temporary Folder or Non Major Folder)/PowerPoint/player1.pptx
+++ b/Used Resorces (Temporary Folder or Non Major Folder)/PowerPoint/player1.pptx
@@ -6,6 +6,7 @@
   </p:sldMasterIdLst>
   <p:sldIdLst>
     <p:sldId id="256" r:id="rId2"/>
+    <p:sldId id="257" r:id="rId3"/>
   </p:sldIdLst>
   <p:sldSz cx="12192000" cy="6858000"/>
   <p:notesSz cx="6858000" cy="9144000"/>
@@ -270,7 +271,7 @@
           <a:p>
             <a:fld id="{532B0938-0E06-4385-961C-0E968AA1097A}" type="datetimeFigureOut">
               <a:rPr lang="en-US" smtClean="0"/>
-              <a:t>9/22/2020</a:t>
+              <a:t>9/29/2020</a:t>
             </a:fld>
             <a:endParaRPr lang="en-US"/>
           </a:p>
@@ -468,7 +469,7 @@
           <a:p>
             <a:fld id="{532B0938-0E06-4385-961C-0E968AA1097A}" type="datetimeFigureOut">
               <a:rPr lang="en-US" smtClean="0"/>
-              <a:t>9/22/2020</a:t>
+              <a:t>9/29/2020</a:t>
             </a:fld>
             <a:endParaRPr lang="en-US"/>
           </a:p>
@@ -676,7 +677,7 @@
           <a:p>
             <a:fld id="{532B0938-0E06-4385-961C-0E968AA1097A}" type="datetimeFigureOut">
               <a:rPr lang="en-US" smtClean="0"/>
-              <a:t>9/22/2020</a:t>
+              <a:t>9/29/2020</a:t>
             </a:fld>
             <a:endParaRPr lang="en-US"/>
           </a:p>
@@ -874,7 +875,7 @@
           <a:p>
             <a:fld id="{532B0938-0E06-4385-961C-0E968AA1097A}" type="datetimeFigureOut">
               <a:rPr lang="en-US" smtClean="0"/>
-              <a:t>9/22/2020</a:t>
+              <a:t>9/29/2020</a:t>
             </a:fld>
             <a:endParaRPr lang="en-US"/>
           </a:p>
@@ -1149,7 +1150,7 @@
           <a:p>
             <a:fld id="{532B0938-0E06-4385-961C-0E968AA1097A}" type="datetimeFigureOut">
               <a:rPr lang="en-US" smtClean="0"/>
-              <a:t>9/22/2020</a:t>
+              <a:t>9/29/2020</a:t>
             </a:fld>
             <a:endParaRPr lang="en-US"/>
           </a:p>
@@ -1414,7 +1415,7 @@
           <a:p>
             <a:fld id="{532B0938-0E06-4385-961C-0E968AA1097A}" type="datetimeFigureOut">
               <a:rPr lang="en-US" smtClean="0"/>
-              <a:t>9/22/2020</a:t>
+              <a:t>9/29/2020</a:t>
             </a:fld>
             <a:endParaRPr lang="en-US"/>
           </a:p>
@@ -1826,7 +1827,7 @@
           <a:p>
             <a:fld id="{532B0938-0E06-4385-961C-0E968AA1097A}" type="datetimeFigureOut">
               <a:rPr lang="en-US" smtClean="0"/>
-              <a:t>9/22/2020</a:t>
+              <a:t>9/29/2020</a:t>
             </a:fld>
             <a:endParaRPr lang="en-US"/>
           </a:p>
@@ -1967,7 +1968,7 @@
           <a:p>
             <a:fld id="{532B0938-0E06-4385-961C-0E968AA1097A}" type="datetimeFigureOut">
               <a:rPr lang="en-US" smtClean="0"/>
-              <a:t>9/22/2020</a:t>
+              <a:t>9/29/2020</a:t>
             </a:fld>
             <a:endParaRPr lang="en-US"/>
           </a:p>
@@ -2080,7 +2081,7 @@
           <a:p>
             <a:fld id="{532B0938-0E06-4385-961C-0E968AA1097A}" type="datetimeFigureOut">
               <a:rPr lang="en-US" smtClean="0"/>
-              <a:t>9/22/2020</a:t>
+              <a:t>9/29/2020</a:t>
             </a:fld>
             <a:endParaRPr lang="en-US"/>
           </a:p>
@@ -2391,7 +2392,7 @@
           <a:p>
             <a:fld id="{532B0938-0E06-4385-961C-0E968AA1097A}" type="datetimeFigureOut">
               <a:rPr lang="en-US" smtClean="0"/>
-              <a:t>9/22/2020</a:t>
+              <a:t>9/29/2020</a:t>
             </a:fld>
             <a:endParaRPr lang="en-US"/>
           </a:p>
@@ -2679,7 +2680,7 @@
           <a:p>
             <a:fld id="{532B0938-0E06-4385-961C-0E968AA1097A}" type="datetimeFigureOut">
               <a:rPr lang="en-US" smtClean="0"/>
-              <a:t>9/22/2020</a:t>
+              <a:t>9/29/2020</a:t>
             </a:fld>
             <a:endParaRPr lang="en-US"/>
           </a:p>
@@ -2920,7 +2921,7 @@
           <a:p>
             <a:fld id="{532B0938-0E06-4385-961C-0E968AA1097A}" type="datetimeFigureOut">
               <a:rPr lang="en-US" smtClean="0"/>
-              <a:t>9/22/2020</a:t>
+              <a:t>9/29/2020</a:t>
             </a:fld>
             <a:endParaRPr lang="en-US"/>
           </a:p>
@@ -3615,6 +3616,797 @@
 </p:sld>
 </file>
 
+<file path=ppt/slides/slide2.xml><?xml version="1.0" encoding="utf-8"?>
+<p:sld xmlns:a="http://schemas.openxmlformats.org/drawingml/2006/main" xmlns:r="http://schemas.openxmlformats.org/officeDocument/2006/relationships" xmlns:p="http://schemas.openxmlformats.org/presentationml/2006/main">
+  <p:cSld>
+    <p:spTree>
+      <p:nvGrpSpPr>
+        <p:cNvPr id="1" name=""/>
+        <p:cNvGrpSpPr/>
+        <p:nvPr/>
+      </p:nvGrpSpPr>
+      <p:grpSpPr>
+        <a:xfrm>
+          <a:off x="0" y="0"/>
+          <a:ext cx="0" cy="0"/>
+          <a:chOff x="0" y="0"/>
+          <a:chExt cx="0" cy="0"/>
+        </a:xfrm>
+      </p:grpSpPr>
+      <p:pic>
+        <p:nvPicPr>
+          <p:cNvPr id="7" name="Picture 6">
+            <a:extLst>
+              <a:ext uri="{FF2B5EF4-FFF2-40B4-BE49-F238E27FC236}">
+                <a16:creationId xmlns:a16="http://schemas.microsoft.com/office/drawing/2014/main" id="{C16288AC-C643-4B98-A84D-9CF688A121A8}"/>
+              </a:ext>
+            </a:extLst>
+          </p:cNvPr>
+          <p:cNvPicPr>
+            <a:picLocks noChangeAspect="1"/>
+          </p:cNvPicPr>
+          <p:nvPr/>
+        </p:nvPicPr>
+        <p:blipFill rotWithShape="1">
+          <a:blip r:embed="rId2">
+            <a:extLst>
+              <a:ext uri="{28A0092B-C50C-407E-A947-70E740481C1C}">
+                <a14:useLocalDpi xmlns:a14="http://schemas.microsoft.com/office/drawing/2010/main" val="0"/>
+              </a:ext>
+            </a:extLst>
+          </a:blip>
+          <a:srcRect t="5123" b="12440"/>
+          <a:stretch/>
+        </p:blipFill>
+        <p:spPr>
+          <a:xfrm>
+            <a:off x="694951" y="361793"/>
+            <a:ext cx="3680471" cy="6325483"/>
+          </a:xfrm>
+          <a:prstGeom prst="rect">
+            <a:avLst/>
+          </a:prstGeom>
+        </p:spPr>
+      </p:pic>
+      <p:pic>
+        <p:nvPicPr>
+          <p:cNvPr id="9" name="Picture 8">
+            <a:extLst>
+              <a:ext uri="{FF2B5EF4-FFF2-40B4-BE49-F238E27FC236}">
+                <a16:creationId xmlns:a16="http://schemas.microsoft.com/office/drawing/2014/main" id="{9A2092A1-FA66-47FA-9A72-C529DA6E589F}"/>
+              </a:ext>
+            </a:extLst>
+          </p:cNvPr>
+          <p:cNvPicPr>
+            <a:picLocks noChangeAspect="1"/>
+          </p:cNvPicPr>
+          <p:nvPr/>
+        </p:nvPicPr>
+        <p:blipFill rotWithShape="1">
+          <a:blip r:embed="rId3">
+            <a:extLst>
+              <a:ext uri="{28A0092B-C50C-407E-A947-70E740481C1C}">
+                <a14:useLocalDpi xmlns:a14="http://schemas.microsoft.com/office/drawing/2010/main" val="0"/>
+              </a:ext>
+            </a:extLst>
+          </a:blip>
+          <a:srcRect t="2985" b="16020"/>
+          <a:stretch/>
+        </p:blipFill>
+        <p:spPr>
+          <a:xfrm>
+            <a:off x="8519985" y="266258"/>
+            <a:ext cx="3395529" cy="6325483"/>
+          </a:xfrm>
+          <a:prstGeom prst="rect">
+            <a:avLst/>
+          </a:prstGeom>
+        </p:spPr>
+      </p:pic>
+      <p:sp>
+        <p:nvSpPr>
+          <p:cNvPr id="8" name="Freeform: Shape 7">
+            <a:extLst>
+              <a:ext uri="{FF2B5EF4-FFF2-40B4-BE49-F238E27FC236}">
+                <a16:creationId xmlns:a16="http://schemas.microsoft.com/office/drawing/2014/main" id="{8CA36860-03EA-4C76-9CC5-6407C4AD5045}"/>
+              </a:ext>
+            </a:extLst>
+          </p:cNvPr>
+          <p:cNvSpPr/>
+          <p:nvPr/>
+        </p:nvSpPr>
+        <p:spPr>
+          <a:xfrm>
+            <a:off x="2956560" y="236220"/>
+            <a:ext cx="990600" cy="2004060"/>
+          </a:xfrm>
+          <a:custGeom>
+            <a:avLst/>
+            <a:gdLst>
+              <a:gd name="connsiteX0" fmla="*/ 0 w 990600"/>
+              <a:gd name="connsiteY0" fmla="*/ 1501140 h 2004060"/>
+              <a:gd name="connsiteX1" fmla="*/ 114300 w 990600"/>
+              <a:gd name="connsiteY1" fmla="*/ 1813560 h 2004060"/>
+              <a:gd name="connsiteX2" fmla="*/ 266700 w 990600"/>
+              <a:gd name="connsiteY2" fmla="*/ 2004060 h 2004060"/>
+              <a:gd name="connsiteX3" fmla="*/ 990600 w 990600"/>
+              <a:gd name="connsiteY3" fmla="*/ 1638300 h 2004060"/>
+              <a:gd name="connsiteX4" fmla="*/ 952500 w 990600"/>
+              <a:gd name="connsiteY4" fmla="*/ 685800 h 2004060"/>
+              <a:gd name="connsiteX5" fmla="*/ 632460 w 990600"/>
+              <a:gd name="connsiteY5" fmla="*/ 38100 h 2004060"/>
+              <a:gd name="connsiteX6" fmla="*/ 76200 w 990600"/>
+              <a:gd name="connsiteY6" fmla="*/ 0 h 2004060"/>
+              <a:gd name="connsiteX7" fmla="*/ 190500 w 990600"/>
+              <a:gd name="connsiteY7" fmla="*/ 1257300 h 2004060"/>
+              <a:gd name="connsiteX8" fmla="*/ 0 w 990600"/>
+              <a:gd name="connsiteY8" fmla="*/ 1501140 h 2004060"/>
+            </a:gdLst>
+            <a:ahLst/>
+            <a:cxnLst>
+              <a:cxn ang="0">
+                <a:pos x="connsiteX0" y="connsiteY0"/>
+              </a:cxn>
+              <a:cxn ang="0">
+                <a:pos x="connsiteX1" y="connsiteY1"/>
+              </a:cxn>
+              <a:cxn ang="0">
+                <a:pos x="connsiteX2" y="connsiteY2"/>
+              </a:cxn>
+              <a:cxn ang="0">
+                <a:pos x="connsiteX3" y="connsiteY3"/>
+              </a:cxn>
+              <a:cxn ang="0">
+                <a:pos x="connsiteX4" y="connsiteY4"/>
+              </a:cxn>
+              <a:cxn ang="0">
+                <a:pos x="connsiteX5" y="connsiteY5"/>
+              </a:cxn>
+              <a:cxn ang="0">
+                <a:pos x="connsiteX6" y="connsiteY6"/>
+              </a:cxn>
+              <a:cxn ang="0">
+                <a:pos x="connsiteX7" y="connsiteY7"/>
+              </a:cxn>
+              <a:cxn ang="0">
+                <a:pos x="connsiteX8" y="connsiteY8"/>
+              </a:cxn>
+            </a:cxnLst>
+            <a:rect l="l" t="t" r="r" b="b"/>
+            <a:pathLst>
+              <a:path w="990600" h="2004060">
+                <a:moveTo>
+                  <a:pt x="0" y="1501140"/>
+                </a:moveTo>
+                <a:lnTo>
+                  <a:pt x="114300" y="1813560"/>
+                </a:lnTo>
+                <a:lnTo>
+                  <a:pt x="266700" y="2004060"/>
+                </a:lnTo>
+                <a:lnTo>
+                  <a:pt x="990600" y="1638300"/>
+                </a:lnTo>
+                <a:lnTo>
+                  <a:pt x="952500" y="685800"/>
+                </a:lnTo>
+                <a:lnTo>
+                  <a:pt x="632460" y="38100"/>
+                </a:lnTo>
+                <a:lnTo>
+                  <a:pt x="76200" y="0"/>
+                </a:lnTo>
+                <a:lnTo>
+                  <a:pt x="190500" y="1257300"/>
+                </a:lnTo>
+                <a:lnTo>
+                  <a:pt x="0" y="1501140"/>
+                </a:lnTo>
+                <a:close/>
+              </a:path>
+            </a:pathLst>
+          </a:custGeom>
+          <a:solidFill>
+            <a:schemeClr val="bg1"/>
+          </a:solidFill>
+          <a:ln>
+            <a:solidFill>
+              <a:schemeClr val="bg1"/>
+            </a:solidFill>
+          </a:ln>
+        </p:spPr>
+        <p:style>
+          <a:lnRef idx="2">
+            <a:schemeClr val="accent1">
+              <a:shade val="50000"/>
+            </a:schemeClr>
+          </a:lnRef>
+          <a:fillRef idx="1">
+            <a:schemeClr val="accent1"/>
+          </a:fillRef>
+          <a:effectRef idx="0">
+            <a:schemeClr val="accent1"/>
+          </a:effectRef>
+          <a:fontRef idx="minor">
+            <a:schemeClr val="lt1"/>
+          </a:fontRef>
+        </p:style>
+        <p:txBody>
+          <a:bodyPr rtlCol="0" anchor="ctr"/>
+          <a:lstStyle/>
+          <a:p>
+            <a:pPr algn="ctr"/>
+            <a:endParaRPr lang="en-US"/>
+          </a:p>
+        </p:txBody>
+      </p:sp>
+      <p:sp>
+        <p:nvSpPr>
+          <p:cNvPr id="11" name="Freeform: Shape 10">
+            <a:extLst>
+              <a:ext uri="{FF2B5EF4-FFF2-40B4-BE49-F238E27FC236}">
+                <a16:creationId xmlns:a16="http://schemas.microsoft.com/office/drawing/2014/main" id="{AF4FC4C7-E56D-4677-AC3B-6D28332FE41C}"/>
+              </a:ext>
+            </a:extLst>
+          </p:cNvPr>
+          <p:cNvSpPr/>
+          <p:nvPr/>
+        </p:nvSpPr>
+        <p:spPr>
+          <a:xfrm>
+            <a:off x="1851660" y="655320"/>
+            <a:ext cx="1158240" cy="1447800"/>
+          </a:xfrm>
+          <a:custGeom>
+            <a:avLst/>
+            <a:gdLst>
+              <a:gd name="connsiteX0" fmla="*/ 114300 w 1158240"/>
+              <a:gd name="connsiteY0" fmla="*/ 609600 h 1447800"/>
+              <a:gd name="connsiteX1" fmla="*/ 99060 w 1158240"/>
+              <a:gd name="connsiteY1" fmla="*/ 1028700 h 1447800"/>
+              <a:gd name="connsiteX2" fmla="*/ 358140 w 1158240"/>
+              <a:gd name="connsiteY2" fmla="*/ 1348740 h 1447800"/>
+              <a:gd name="connsiteX3" fmla="*/ 571500 w 1158240"/>
+              <a:gd name="connsiteY3" fmla="*/ 1447800 h 1447800"/>
+              <a:gd name="connsiteX4" fmla="*/ 723900 w 1158240"/>
+              <a:gd name="connsiteY4" fmla="*/ 1104900 h 1447800"/>
+              <a:gd name="connsiteX5" fmla="*/ 975360 w 1158240"/>
+              <a:gd name="connsiteY5" fmla="*/ 876300 h 1447800"/>
+              <a:gd name="connsiteX6" fmla="*/ 1158240 w 1158240"/>
+              <a:gd name="connsiteY6" fmla="*/ 670560 h 1447800"/>
+              <a:gd name="connsiteX7" fmla="*/ 952500 w 1158240"/>
+              <a:gd name="connsiteY7" fmla="*/ 365760 h 1447800"/>
+              <a:gd name="connsiteX8" fmla="*/ 708660 w 1158240"/>
+              <a:gd name="connsiteY8" fmla="*/ 0 h 1447800"/>
+              <a:gd name="connsiteX9" fmla="*/ 60960 w 1158240"/>
+              <a:gd name="connsiteY9" fmla="*/ 91440 h 1447800"/>
+              <a:gd name="connsiteX10" fmla="*/ 0 w 1158240"/>
+              <a:gd name="connsiteY10" fmla="*/ 571500 h 1447800"/>
+              <a:gd name="connsiteX11" fmla="*/ 114300 w 1158240"/>
+              <a:gd name="connsiteY11" fmla="*/ 609600 h 1447800"/>
+            </a:gdLst>
+            <a:ahLst/>
+            <a:cxnLst>
+              <a:cxn ang="0">
+                <a:pos x="connsiteX0" y="connsiteY0"/>
+              </a:cxn>
+              <a:cxn ang="0">
+                <a:pos x="connsiteX1" y="connsiteY1"/>
+              </a:cxn>
+              <a:cxn ang="0">
+                <a:pos x="connsiteX2" y="connsiteY2"/>
+              </a:cxn>
+              <a:cxn ang="0">
+                <a:pos x="connsiteX3" y="connsiteY3"/>
+              </a:cxn>
+              <a:cxn ang="0">
+                <a:pos x="connsiteX4" y="connsiteY4"/>
+              </a:cxn>
+              <a:cxn ang="0">
+                <a:pos x="connsiteX5" y="connsiteY5"/>
+              </a:cxn>
+              <a:cxn ang="0">
+                <a:pos x="connsiteX6" y="connsiteY6"/>
+              </a:cxn>
+              <a:cxn ang="0">
+                <a:pos x="connsiteX7" y="connsiteY7"/>
+              </a:cxn>
+              <a:cxn ang="0">
+                <a:pos x="connsiteX8" y="connsiteY8"/>
+              </a:cxn>
+              <a:cxn ang="0">
+                <a:pos x="connsiteX9" y="connsiteY9"/>
+              </a:cxn>
+              <a:cxn ang="0">
+                <a:pos x="connsiteX10" y="connsiteY10"/>
+              </a:cxn>
+              <a:cxn ang="0">
+                <a:pos x="connsiteX11" y="connsiteY11"/>
+              </a:cxn>
+            </a:cxnLst>
+            <a:rect l="l" t="t" r="r" b="b"/>
+            <a:pathLst>
+              <a:path w="1158240" h="1447800">
+                <a:moveTo>
+                  <a:pt x="114300" y="609600"/>
+                </a:moveTo>
+                <a:lnTo>
+                  <a:pt x="99060" y="1028700"/>
+                </a:lnTo>
+                <a:lnTo>
+                  <a:pt x="358140" y="1348740"/>
+                </a:lnTo>
+                <a:lnTo>
+                  <a:pt x="571500" y="1447800"/>
+                </a:lnTo>
+                <a:lnTo>
+                  <a:pt x="723900" y="1104900"/>
+                </a:lnTo>
+                <a:lnTo>
+                  <a:pt x="975360" y="876300"/>
+                </a:lnTo>
+                <a:lnTo>
+                  <a:pt x="1158240" y="670560"/>
+                </a:lnTo>
+                <a:lnTo>
+                  <a:pt x="952500" y="365760"/>
+                </a:lnTo>
+                <a:lnTo>
+                  <a:pt x="708660" y="0"/>
+                </a:lnTo>
+                <a:lnTo>
+                  <a:pt x="60960" y="91440"/>
+                </a:lnTo>
+                <a:lnTo>
+                  <a:pt x="0" y="571500"/>
+                </a:lnTo>
+                <a:lnTo>
+                  <a:pt x="114300" y="609600"/>
+                </a:lnTo>
+                <a:close/>
+              </a:path>
+            </a:pathLst>
+          </a:custGeom>
+          <a:solidFill>
+            <a:schemeClr val="bg1"/>
+          </a:solidFill>
+          <a:ln>
+            <a:solidFill>
+              <a:schemeClr val="bg1"/>
+            </a:solidFill>
+          </a:ln>
+        </p:spPr>
+        <p:style>
+          <a:lnRef idx="2">
+            <a:schemeClr val="accent1">
+              <a:shade val="50000"/>
+            </a:schemeClr>
+          </a:lnRef>
+          <a:fillRef idx="1">
+            <a:schemeClr val="accent1"/>
+          </a:fillRef>
+          <a:effectRef idx="0">
+            <a:schemeClr val="accent1"/>
+          </a:effectRef>
+          <a:fontRef idx="minor">
+            <a:schemeClr val="lt1"/>
+          </a:fontRef>
+        </p:style>
+        <p:txBody>
+          <a:bodyPr rtlCol="0" anchor="ctr"/>
+          <a:lstStyle/>
+          <a:p>
+            <a:pPr algn="ctr"/>
+            <a:endParaRPr lang="en-US"/>
+          </a:p>
+        </p:txBody>
+      </p:sp>
+      <p:pic>
+        <p:nvPicPr>
+          <p:cNvPr id="13" name="Picture 12">
+            <a:extLst>
+              <a:ext uri="{FF2B5EF4-FFF2-40B4-BE49-F238E27FC236}">
+                <a16:creationId xmlns:a16="http://schemas.microsoft.com/office/drawing/2014/main" id="{05548C71-078F-4BF9-937F-7F0F585FF8EB}"/>
+              </a:ext>
+            </a:extLst>
+          </p:cNvPr>
+          <p:cNvPicPr>
+            <a:picLocks noChangeAspect="1"/>
+          </p:cNvPicPr>
+          <p:nvPr/>
+        </p:nvPicPr>
+        <p:blipFill rotWithShape="1">
+          <a:blip r:embed="rId4">
+            <a:extLst>
+              <a:ext uri="{28A0092B-C50C-407E-A947-70E740481C1C}">
+                <a14:useLocalDpi xmlns:a14="http://schemas.microsoft.com/office/drawing/2010/main" val="0"/>
+              </a:ext>
+            </a:extLst>
+          </a:blip>
+          <a:srcRect l="42207" r="29391" b="80960"/>
+          <a:stretch/>
+        </p:blipFill>
+        <p:spPr>
+          <a:xfrm>
+            <a:off x="2064503" y="899159"/>
+            <a:ext cx="1079557" cy="1204401"/>
+          </a:xfrm>
+          <a:prstGeom prst="rect">
+            <a:avLst/>
+          </a:prstGeom>
+        </p:spPr>
+      </p:pic>
+      <p:pic>
+        <p:nvPicPr>
+          <p:cNvPr id="6" name="Picture 5">
+            <a:extLst>
+              <a:ext uri="{FF2B5EF4-FFF2-40B4-BE49-F238E27FC236}">
+                <a16:creationId xmlns:a16="http://schemas.microsoft.com/office/drawing/2014/main" id="{61167E0A-6AAD-4594-ABCD-4E9B08AFAC5B}"/>
+              </a:ext>
+            </a:extLst>
+          </p:cNvPr>
+          <p:cNvPicPr>
+            <a:picLocks noChangeAspect="1"/>
+          </p:cNvPicPr>
+          <p:nvPr/>
+        </p:nvPicPr>
+        <p:blipFill rotWithShape="1">
+          <a:blip r:embed="rId5">
+            <a:extLst>
+              <a:ext uri="{28A0092B-C50C-407E-A947-70E740481C1C}">
+                <a14:useLocalDpi xmlns:a14="http://schemas.microsoft.com/office/drawing/2010/main" val="0"/>
+              </a:ext>
+            </a:extLst>
+          </a:blip>
+          <a:srcRect t="10488" r="56001" b="75688"/>
+          <a:stretch/>
+        </p:blipFill>
+        <p:spPr>
+          <a:xfrm flipH="1">
+            <a:off x="3075984" y="1578375"/>
+            <a:ext cx="1651945" cy="730265"/>
+          </a:xfrm>
+          <a:prstGeom prst="rect">
+            <a:avLst/>
+          </a:prstGeom>
+        </p:spPr>
+      </p:pic>
+      <p:sp>
+        <p:nvSpPr>
+          <p:cNvPr id="14" name="Freeform: Shape 13">
+            <a:extLst>
+              <a:ext uri="{FF2B5EF4-FFF2-40B4-BE49-F238E27FC236}">
+                <a16:creationId xmlns:a16="http://schemas.microsoft.com/office/drawing/2014/main" id="{3AA06215-DC67-4D6D-83AB-0624C9961FCC}"/>
+              </a:ext>
+            </a:extLst>
+          </p:cNvPr>
+          <p:cNvSpPr/>
+          <p:nvPr/>
+        </p:nvSpPr>
+        <p:spPr>
+          <a:xfrm>
+            <a:off x="2995613" y="1866900"/>
+            <a:ext cx="142875" cy="214313"/>
+          </a:xfrm>
+          <a:custGeom>
+            <a:avLst/>
+            <a:gdLst>
+              <a:gd name="connsiteX0" fmla="*/ 0 w 142875"/>
+              <a:gd name="connsiteY0" fmla="*/ 0 h 214313"/>
+              <a:gd name="connsiteX1" fmla="*/ 85725 w 142875"/>
+              <a:gd name="connsiteY1" fmla="*/ 14288 h 214313"/>
+              <a:gd name="connsiteX2" fmla="*/ 142875 w 142875"/>
+              <a:gd name="connsiteY2" fmla="*/ 214313 h 214313"/>
+              <a:gd name="connsiteX3" fmla="*/ 9525 w 142875"/>
+              <a:gd name="connsiteY3" fmla="*/ 166688 h 214313"/>
+              <a:gd name="connsiteX4" fmla="*/ 0 w 142875"/>
+              <a:gd name="connsiteY4" fmla="*/ 0 h 214313"/>
+            </a:gdLst>
+            <a:ahLst/>
+            <a:cxnLst>
+              <a:cxn ang="0">
+                <a:pos x="connsiteX0" y="connsiteY0"/>
+              </a:cxn>
+              <a:cxn ang="0">
+                <a:pos x="connsiteX1" y="connsiteY1"/>
+              </a:cxn>
+              <a:cxn ang="0">
+                <a:pos x="connsiteX2" y="connsiteY2"/>
+              </a:cxn>
+              <a:cxn ang="0">
+                <a:pos x="connsiteX3" y="connsiteY3"/>
+              </a:cxn>
+              <a:cxn ang="0">
+                <a:pos x="connsiteX4" y="connsiteY4"/>
+              </a:cxn>
+            </a:cxnLst>
+            <a:rect l="l" t="t" r="r" b="b"/>
+            <a:pathLst>
+              <a:path w="142875" h="214313">
+                <a:moveTo>
+                  <a:pt x="0" y="0"/>
+                </a:moveTo>
+                <a:lnTo>
+                  <a:pt x="85725" y="14288"/>
+                </a:lnTo>
+                <a:lnTo>
+                  <a:pt x="142875" y="214313"/>
+                </a:lnTo>
+                <a:lnTo>
+                  <a:pt x="9525" y="166688"/>
+                </a:lnTo>
+                <a:lnTo>
+                  <a:pt x="0" y="0"/>
+                </a:lnTo>
+                <a:close/>
+              </a:path>
+            </a:pathLst>
+          </a:custGeom>
+          <a:solidFill>
+            <a:srgbClr val="111B3E"/>
+          </a:solidFill>
+          <a:ln>
+            <a:solidFill>
+              <a:srgbClr val="111B3E"/>
+            </a:solidFill>
+          </a:ln>
+        </p:spPr>
+        <p:style>
+          <a:lnRef idx="2">
+            <a:schemeClr val="accent1">
+              <a:shade val="50000"/>
+            </a:schemeClr>
+          </a:lnRef>
+          <a:fillRef idx="1">
+            <a:schemeClr val="accent1"/>
+          </a:fillRef>
+          <a:effectRef idx="0">
+            <a:schemeClr val="accent1"/>
+          </a:effectRef>
+          <a:fontRef idx="minor">
+            <a:schemeClr val="lt1"/>
+          </a:fontRef>
+        </p:style>
+        <p:txBody>
+          <a:bodyPr rtlCol="0" anchor="ctr"/>
+          <a:lstStyle/>
+          <a:p>
+            <a:pPr algn="ctr"/>
+            <a:endParaRPr lang="en-US"/>
+          </a:p>
+        </p:txBody>
+      </p:sp>
+      <p:sp>
+        <p:nvSpPr>
+          <p:cNvPr id="15" name="Freeform: Shape 14">
+            <a:extLst>
+              <a:ext uri="{FF2B5EF4-FFF2-40B4-BE49-F238E27FC236}">
+                <a16:creationId xmlns:a16="http://schemas.microsoft.com/office/drawing/2014/main" id="{AD38C9A3-6C08-4DAA-8725-8D1D9C012D6C}"/>
+              </a:ext>
+            </a:extLst>
+          </p:cNvPr>
+          <p:cNvSpPr/>
+          <p:nvPr/>
+        </p:nvSpPr>
+        <p:spPr>
+          <a:xfrm>
+            <a:off x="2052638" y="1905000"/>
+            <a:ext cx="242887" cy="214313"/>
+          </a:xfrm>
+          <a:custGeom>
+            <a:avLst/>
+            <a:gdLst>
+              <a:gd name="connsiteX0" fmla="*/ 0 w 242887"/>
+              <a:gd name="connsiteY0" fmla="*/ 80963 h 214313"/>
+              <a:gd name="connsiteX1" fmla="*/ 14287 w 242887"/>
+              <a:gd name="connsiteY1" fmla="*/ 23813 h 214313"/>
+              <a:gd name="connsiteX2" fmla="*/ 76200 w 242887"/>
+              <a:gd name="connsiteY2" fmla="*/ 0 h 214313"/>
+              <a:gd name="connsiteX3" fmla="*/ 242887 w 242887"/>
+              <a:gd name="connsiteY3" fmla="*/ 190500 h 214313"/>
+              <a:gd name="connsiteX4" fmla="*/ 28575 w 242887"/>
+              <a:gd name="connsiteY4" fmla="*/ 214313 h 214313"/>
+              <a:gd name="connsiteX5" fmla="*/ 0 w 242887"/>
+              <a:gd name="connsiteY5" fmla="*/ 80963 h 214313"/>
+            </a:gdLst>
+            <a:ahLst/>
+            <a:cxnLst>
+              <a:cxn ang="0">
+                <a:pos x="connsiteX0" y="connsiteY0"/>
+              </a:cxn>
+              <a:cxn ang="0">
+                <a:pos x="connsiteX1" y="connsiteY1"/>
+              </a:cxn>
+              <a:cxn ang="0">
+                <a:pos x="connsiteX2" y="connsiteY2"/>
+              </a:cxn>
+              <a:cxn ang="0">
+                <a:pos x="connsiteX3" y="connsiteY3"/>
+              </a:cxn>
+              <a:cxn ang="0">
+                <a:pos x="connsiteX4" y="connsiteY4"/>
+              </a:cxn>
+              <a:cxn ang="0">
+                <a:pos x="connsiteX5" y="connsiteY5"/>
+              </a:cxn>
+            </a:cxnLst>
+            <a:rect l="l" t="t" r="r" b="b"/>
+            <a:pathLst>
+              <a:path w="242887" h="214313">
+                <a:moveTo>
+                  <a:pt x="0" y="80963"/>
+                </a:moveTo>
+                <a:lnTo>
+                  <a:pt x="14287" y="23813"/>
+                </a:lnTo>
+                <a:lnTo>
+                  <a:pt x="76200" y="0"/>
+                </a:lnTo>
+                <a:lnTo>
+                  <a:pt x="242887" y="190500"/>
+                </a:lnTo>
+                <a:lnTo>
+                  <a:pt x="28575" y="214313"/>
+                </a:lnTo>
+                <a:lnTo>
+                  <a:pt x="0" y="80963"/>
+                </a:lnTo>
+                <a:close/>
+              </a:path>
+            </a:pathLst>
+          </a:custGeom>
+          <a:solidFill>
+            <a:srgbClr val="111B3E"/>
+          </a:solidFill>
+          <a:ln>
+            <a:solidFill>
+              <a:srgbClr val="111B3E"/>
+            </a:solidFill>
+          </a:ln>
+        </p:spPr>
+        <p:style>
+          <a:lnRef idx="2">
+            <a:schemeClr val="accent1">
+              <a:shade val="50000"/>
+            </a:schemeClr>
+          </a:lnRef>
+          <a:fillRef idx="1">
+            <a:schemeClr val="accent1"/>
+          </a:fillRef>
+          <a:effectRef idx="0">
+            <a:schemeClr val="accent1"/>
+          </a:effectRef>
+          <a:fontRef idx="minor">
+            <a:schemeClr val="lt1"/>
+          </a:fontRef>
+        </p:style>
+        <p:txBody>
+          <a:bodyPr rtlCol="0" anchor="ctr"/>
+          <a:lstStyle/>
+          <a:p>
+            <a:pPr algn="ctr"/>
+            <a:endParaRPr lang="en-US"/>
+          </a:p>
+        </p:txBody>
+      </p:sp>
+      <p:sp>
+        <p:nvSpPr>
+          <p:cNvPr id="16" name="Freeform: Shape 15">
+            <a:extLst>
+              <a:ext uri="{FF2B5EF4-FFF2-40B4-BE49-F238E27FC236}">
+                <a16:creationId xmlns:a16="http://schemas.microsoft.com/office/drawing/2014/main" id="{AED0ED49-C9FE-4E46-B222-F7EFD3CD8D3C}"/>
+              </a:ext>
+            </a:extLst>
+          </p:cNvPr>
+          <p:cNvSpPr/>
+          <p:nvPr/>
+        </p:nvSpPr>
+        <p:spPr>
+          <a:xfrm>
+            <a:off x="2662238" y="1976438"/>
+            <a:ext cx="438150" cy="142875"/>
+          </a:xfrm>
+          <a:custGeom>
+            <a:avLst/>
+            <a:gdLst>
+              <a:gd name="connsiteX0" fmla="*/ 0 w 438150"/>
+              <a:gd name="connsiteY0" fmla="*/ 128587 h 142875"/>
+              <a:gd name="connsiteX1" fmla="*/ 252412 w 438150"/>
+              <a:gd name="connsiteY1" fmla="*/ 0 h 142875"/>
+              <a:gd name="connsiteX2" fmla="*/ 438150 w 438150"/>
+              <a:gd name="connsiteY2" fmla="*/ 95250 h 142875"/>
+              <a:gd name="connsiteX3" fmla="*/ 428625 w 438150"/>
+              <a:gd name="connsiteY3" fmla="*/ 142875 h 142875"/>
+              <a:gd name="connsiteX4" fmla="*/ 0 w 438150"/>
+              <a:gd name="connsiteY4" fmla="*/ 128587 h 142875"/>
+            </a:gdLst>
+            <a:ahLst/>
+            <a:cxnLst>
+              <a:cxn ang="0">
+                <a:pos x="connsiteX0" y="connsiteY0"/>
+              </a:cxn>
+              <a:cxn ang="0">
+                <a:pos x="connsiteX1" y="connsiteY1"/>
+              </a:cxn>
+              <a:cxn ang="0">
+                <a:pos x="connsiteX2" y="connsiteY2"/>
+              </a:cxn>
+              <a:cxn ang="0">
+                <a:pos x="connsiteX3" y="connsiteY3"/>
+              </a:cxn>
+              <a:cxn ang="0">
+                <a:pos x="connsiteX4" y="connsiteY4"/>
+              </a:cxn>
+            </a:cxnLst>
+            <a:rect l="l" t="t" r="r" b="b"/>
+            <a:pathLst>
+              <a:path w="438150" h="142875">
+                <a:moveTo>
+                  <a:pt x="0" y="128587"/>
+                </a:moveTo>
+                <a:lnTo>
+                  <a:pt x="252412" y="0"/>
+                </a:lnTo>
+                <a:lnTo>
+                  <a:pt x="438150" y="95250"/>
+                </a:lnTo>
+                <a:lnTo>
+                  <a:pt x="428625" y="142875"/>
+                </a:lnTo>
+                <a:lnTo>
+                  <a:pt x="0" y="128587"/>
+                </a:lnTo>
+                <a:close/>
+              </a:path>
+            </a:pathLst>
+          </a:custGeom>
+          <a:solidFill>
+            <a:srgbClr val="111B3E"/>
+          </a:solidFill>
+          <a:ln>
+            <a:solidFill>
+              <a:srgbClr val="111B3E"/>
+            </a:solidFill>
+          </a:ln>
+        </p:spPr>
+        <p:style>
+          <a:lnRef idx="2">
+            <a:schemeClr val="accent1">
+              <a:shade val="50000"/>
+            </a:schemeClr>
+          </a:lnRef>
+          <a:fillRef idx="1">
+            <a:schemeClr val="accent1"/>
+          </a:fillRef>
+          <a:effectRef idx="0">
+            <a:schemeClr val="accent1"/>
+          </a:effectRef>
+          <a:fontRef idx="minor">
+            <a:schemeClr val="lt1"/>
+          </a:fontRef>
+        </p:style>
+        <p:txBody>
+          <a:bodyPr rtlCol="0" anchor="ctr"/>
+          <a:lstStyle/>
+          <a:p>
+            <a:pPr algn="ctr"/>
+            <a:endParaRPr lang="en-US"/>
+          </a:p>
+        </p:txBody>
+      </p:sp>
+    </p:spTree>
+    <p:extLst>
+      <p:ext uri="{BB962C8B-B14F-4D97-AF65-F5344CB8AC3E}">
+        <p14:creationId xmlns:p14="http://schemas.microsoft.com/office/powerpoint/2010/main" val="2565908066"/>
+      </p:ext>
+    </p:extLst>
+  </p:cSld>
+  <p:clrMapOvr>
+    <a:masterClrMapping/>
+  </p:clrMapOvr>
+</p:sld>
+</file>
+
 <file path=ppt/theme/theme1.xml><?xml version="1.0" encoding="utf-8"?>
 <a:theme xmlns:a="http://schemas.openxmlformats.org/drawingml/2006/main" name="Office Theme">
   <a:themeElements>

</xml_diff>